<commit_message>
Adicionando HLD e LLD
</commit_message>
<xml_diff>
--- a/Análise de Sistemas/HLD&&LLD.pptx
+++ b/Análise de Sistemas/HLD&&LLD.pptx
@@ -6,7 +6,9 @@
   </p:sldMasterIdLst>
   <p:sldIdLst>
     <p:sldId id="256" r:id="rId2"/>
-    <p:sldId id="257" r:id="rId3"/>
+    <p:sldId id="259" r:id="rId3"/>
+    <p:sldId id="257" r:id="rId4"/>
+    <p:sldId id="258" r:id="rId5"/>
   </p:sldIdLst>
   <p:sldSz cx="12192000" cy="6858000"/>
   <p:notesSz cx="6858000" cy="9144000"/>
@@ -105,6 +107,11 @@
       </a:defRPr>
     </a:lvl9pPr>
   </p:defaultTextStyle>
+  <p:extLst>
+    <p:ext uri="{EFAFB233-063F-42B5-8137-9DF3F51BA10A}">
+      <p15:sldGuideLst xmlns:p15="http://schemas.microsoft.com/office/powerpoint/2012/main"/>
+    </p:ext>
+  </p:extLst>
 </p:presentation>
 </file>
 
@@ -255,7 +262,7 @@
           <a:p>
             <a:fld id="{1772B6FB-DCF0-4C60-8965-4B47D1E0E0FD}" type="datetimeFigureOut">
               <a:rPr lang="pt-BR" smtClean="0"/>
-              <a:t>01/09/2021</a:t>
+              <a:t>03/09/2021</a:t>
             </a:fld>
             <a:endParaRPr lang="pt-BR"/>
           </a:p>
@@ -453,7 +460,7 @@
           <a:p>
             <a:fld id="{1772B6FB-DCF0-4C60-8965-4B47D1E0E0FD}" type="datetimeFigureOut">
               <a:rPr lang="pt-BR" smtClean="0"/>
-              <a:t>01/09/2021</a:t>
+              <a:t>03/09/2021</a:t>
             </a:fld>
             <a:endParaRPr lang="pt-BR"/>
           </a:p>
@@ -661,7 +668,7 @@
           <a:p>
             <a:fld id="{1772B6FB-DCF0-4C60-8965-4B47D1E0E0FD}" type="datetimeFigureOut">
               <a:rPr lang="pt-BR" smtClean="0"/>
-              <a:t>01/09/2021</a:t>
+              <a:t>03/09/2021</a:t>
             </a:fld>
             <a:endParaRPr lang="pt-BR"/>
           </a:p>
@@ -859,7 +866,7 @@
           <a:p>
             <a:fld id="{1772B6FB-DCF0-4C60-8965-4B47D1E0E0FD}" type="datetimeFigureOut">
               <a:rPr lang="pt-BR" smtClean="0"/>
-              <a:t>01/09/2021</a:t>
+              <a:t>03/09/2021</a:t>
             </a:fld>
             <a:endParaRPr lang="pt-BR"/>
           </a:p>
@@ -1134,7 +1141,7 @@
           <a:p>
             <a:fld id="{1772B6FB-DCF0-4C60-8965-4B47D1E0E0FD}" type="datetimeFigureOut">
               <a:rPr lang="pt-BR" smtClean="0"/>
-              <a:t>01/09/2021</a:t>
+              <a:t>03/09/2021</a:t>
             </a:fld>
             <a:endParaRPr lang="pt-BR"/>
           </a:p>
@@ -1399,7 +1406,7 @@
           <a:p>
             <a:fld id="{1772B6FB-DCF0-4C60-8965-4B47D1E0E0FD}" type="datetimeFigureOut">
               <a:rPr lang="pt-BR" smtClean="0"/>
-              <a:t>01/09/2021</a:t>
+              <a:t>03/09/2021</a:t>
             </a:fld>
             <a:endParaRPr lang="pt-BR"/>
           </a:p>
@@ -1811,7 +1818,7 @@
           <a:p>
             <a:fld id="{1772B6FB-DCF0-4C60-8965-4B47D1E0E0FD}" type="datetimeFigureOut">
               <a:rPr lang="pt-BR" smtClean="0"/>
-              <a:t>01/09/2021</a:t>
+              <a:t>03/09/2021</a:t>
             </a:fld>
             <a:endParaRPr lang="pt-BR"/>
           </a:p>
@@ -1952,7 +1959,7 @@
           <a:p>
             <a:fld id="{1772B6FB-DCF0-4C60-8965-4B47D1E0E0FD}" type="datetimeFigureOut">
               <a:rPr lang="pt-BR" smtClean="0"/>
-              <a:t>01/09/2021</a:t>
+              <a:t>03/09/2021</a:t>
             </a:fld>
             <a:endParaRPr lang="pt-BR"/>
           </a:p>
@@ -2065,7 +2072,7 @@
           <a:p>
             <a:fld id="{1772B6FB-DCF0-4C60-8965-4B47D1E0E0FD}" type="datetimeFigureOut">
               <a:rPr lang="pt-BR" smtClean="0"/>
-              <a:t>01/09/2021</a:t>
+              <a:t>03/09/2021</a:t>
             </a:fld>
             <a:endParaRPr lang="pt-BR"/>
           </a:p>
@@ -2376,7 +2383,7 @@
           <a:p>
             <a:fld id="{1772B6FB-DCF0-4C60-8965-4B47D1E0E0FD}" type="datetimeFigureOut">
               <a:rPr lang="pt-BR" smtClean="0"/>
-              <a:t>01/09/2021</a:t>
+              <a:t>03/09/2021</a:t>
             </a:fld>
             <a:endParaRPr lang="pt-BR"/>
           </a:p>
@@ -2664,7 +2671,7 @@
           <a:p>
             <a:fld id="{1772B6FB-DCF0-4C60-8965-4B47D1E0E0FD}" type="datetimeFigureOut">
               <a:rPr lang="pt-BR" smtClean="0"/>
-              <a:t>01/09/2021</a:t>
+              <a:t>03/09/2021</a:t>
             </a:fld>
             <a:endParaRPr lang="pt-BR"/>
           </a:p>
@@ -2905,7 +2912,7 @@
           <a:p>
             <a:fld id="{1772B6FB-DCF0-4C60-8965-4B47D1E0E0FD}" type="datetimeFigureOut">
               <a:rPr lang="pt-BR" smtClean="0"/>
-              <a:t>01/09/2021</a:t>
+              <a:t>03/09/2021</a:t>
             </a:fld>
             <a:endParaRPr lang="pt-BR"/>
           </a:p>
@@ -3428,6 +3435,934 @@
           <a:chExt cx="0" cy="0"/>
         </a:xfrm>
       </p:grpSpPr>
+      <p:grpSp>
+        <p:nvGrpSpPr>
+          <p:cNvPr id="21" name="Agrupar 20"/>
+          <p:cNvGrpSpPr/>
+          <p:nvPr/>
+        </p:nvGrpSpPr>
+        <p:grpSpPr>
+          <a:xfrm>
+            <a:off x="4440648" y="-155451"/>
+            <a:ext cx="3364973" cy="2836090"/>
+            <a:chOff x="4495799" y="1976632"/>
+            <a:chExt cx="3225801" cy="2592685"/>
+          </a:xfrm>
+        </p:grpSpPr>
+        <p:pic>
+          <p:nvPicPr>
+            <p:cNvPr id="16" name="Imagem 15"/>
+            <p:cNvPicPr>
+              <a:picLocks noChangeAspect="1"/>
+            </p:cNvPicPr>
+            <p:nvPr/>
+          </p:nvPicPr>
+          <p:blipFill>
+            <a:blip r:embed="rId2">
+              <a:extLst>
+                <a:ext uri="{28A0092B-C50C-407E-A947-70E740481C1C}">
+                  <a14:useLocalDpi xmlns:a14="http://schemas.microsoft.com/office/drawing/2010/main" val="0"/>
+                </a:ext>
+              </a:extLst>
+            </a:blip>
+            <a:stretch>
+              <a:fillRect/>
+            </a:stretch>
+          </p:blipFill>
+          <p:spPr>
+            <a:xfrm>
+              <a:off x="4495799" y="1976632"/>
+              <a:ext cx="3225801" cy="2592685"/>
+            </a:xfrm>
+            <a:prstGeom prst="rect">
+              <a:avLst/>
+            </a:prstGeom>
+          </p:spPr>
+        </p:pic>
+        <p:pic>
+          <p:nvPicPr>
+            <p:cNvPr id="17" name="Imagem 16"/>
+            <p:cNvPicPr>
+              <a:picLocks noChangeAspect="1"/>
+            </p:cNvPicPr>
+            <p:nvPr/>
+          </p:nvPicPr>
+          <p:blipFill>
+            <a:blip r:embed="rId3" cstate="hqprint">
+              <a:extLst>
+                <a:ext uri="{28A0092B-C50C-407E-A947-70E740481C1C}">
+                  <a14:useLocalDpi xmlns:a14="http://schemas.microsoft.com/office/drawing/2010/main" val="0"/>
+                </a:ext>
+              </a:extLst>
+            </a:blip>
+            <a:stretch>
+              <a:fillRect/>
+            </a:stretch>
+          </p:blipFill>
+          <p:spPr>
+            <a:xfrm>
+              <a:off x="6084457" y="2521619"/>
+              <a:ext cx="658085" cy="658085"/>
+            </a:xfrm>
+            <a:prstGeom prst="rect">
+              <a:avLst/>
+            </a:prstGeom>
+          </p:spPr>
+        </p:pic>
+        <p:pic>
+          <p:nvPicPr>
+            <p:cNvPr id="18" name="Imagem 17"/>
+            <p:cNvPicPr>
+              <a:picLocks noChangeAspect="1"/>
+            </p:cNvPicPr>
+            <p:nvPr/>
+          </p:nvPicPr>
+          <p:blipFill>
+            <a:blip r:embed="rId4" cstate="hqprint">
+              <a:extLst>
+                <a:ext uri="{28A0092B-C50C-407E-A947-70E740481C1C}">
+                  <a14:useLocalDpi xmlns:a14="http://schemas.microsoft.com/office/drawing/2010/main" val="0"/>
+                </a:ext>
+              </a:extLst>
+            </a:blip>
+            <a:stretch>
+              <a:fillRect/>
+            </a:stretch>
+          </p:blipFill>
+          <p:spPr>
+            <a:xfrm>
+              <a:off x="6472732" y="3269357"/>
+              <a:ext cx="665318" cy="665318"/>
+            </a:xfrm>
+            <a:prstGeom prst="rect">
+              <a:avLst/>
+            </a:prstGeom>
+          </p:spPr>
+        </p:pic>
+        <p:pic>
+          <p:nvPicPr>
+            <p:cNvPr id="19" name="Imagem 18"/>
+            <p:cNvPicPr>
+              <a:picLocks noChangeAspect="1"/>
+            </p:cNvPicPr>
+            <p:nvPr/>
+          </p:nvPicPr>
+          <p:blipFill>
+            <a:blip r:embed="rId5" cstate="hqprint">
+              <a:extLst>
+                <a:ext uri="{28A0092B-C50C-407E-A947-70E740481C1C}">
+                  <a14:useLocalDpi xmlns:a14="http://schemas.microsoft.com/office/drawing/2010/main" val="0"/>
+                </a:ext>
+              </a:extLst>
+            </a:blip>
+            <a:stretch>
+              <a:fillRect/>
+            </a:stretch>
+          </p:blipFill>
+          <p:spPr>
+            <a:xfrm>
+              <a:off x="5811682" y="3250390"/>
+              <a:ext cx="687875" cy="687875"/>
+            </a:xfrm>
+            <a:prstGeom prst="rect">
+              <a:avLst/>
+            </a:prstGeom>
+          </p:spPr>
+        </p:pic>
+        <p:pic>
+          <p:nvPicPr>
+            <p:cNvPr id="20" name="Imagem 19"/>
+            <p:cNvPicPr>
+              <a:picLocks noChangeAspect="1"/>
+            </p:cNvPicPr>
+            <p:nvPr/>
+          </p:nvPicPr>
+          <p:blipFill>
+            <a:blip r:embed="rId6" cstate="hqprint">
+              <a:extLst>
+                <a:ext uri="{28A0092B-C50C-407E-A947-70E740481C1C}">
+                  <a14:useLocalDpi xmlns:a14="http://schemas.microsoft.com/office/drawing/2010/main" val="0"/>
+                </a:ext>
+              </a:extLst>
+            </a:blip>
+            <a:stretch>
+              <a:fillRect/>
+            </a:stretch>
+          </p:blipFill>
+          <p:spPr>
+            <a:xfrm>
+              <a:off x="5207456" y="3179704"/>
+              <a:ext cx="547402" cy="547402"/>
+            </a:xfrm>
+            <a:prstGeom prst="rect">
+              <a:avLst/>
+            </a:prstGeom>
+          </p:spPr>
+        </p:pic>
+      </p:grpSp>
+      <p:grpSp>
+        <p:nvGrpSpPr>
+          <p:cNvPr id="22" name="Agrupar 21"/>
+          <p:cNvGrpSpPr/>
+          <p:nvPr/>
+        </p:nvGrpSpPr>
+        <p:grpSpPr>
+          <a:xfrm>
+            <a:off x="615183" y="3524061"/>
+            <a:ext cx="859753" cy="568517"/>
+            <a:chOff x="5199410" y="2773607"/>
+            <a:chExt cx="1506190" cy="976150"/>
+          </a:xfrm>
+        </p:grpSpPr>
+        <p:pic>
+          <p:nvPicPr>
+            <p:cNvPr id="23" name="Imagem 22"/>
+            <p:cNvPicPr>
+              <a:picLocks noChangeAspect="1"/>
+            </p:cNvPicPr>
+            <p:nvPr/>
+          </p:nvPicPr>
+          <p:blipFill>
+            <a:blip r:embed="rId7" cstate="hqprint">
+              <a:extLst>
+                <a:ext uri="{28A0092B-C50C-407E-A947-70E740481C1C}">
+                  <a14:useLocalDpi xmlns:a14="http://schemas.microsoft.com/office/drawing/2010/main" val="0"/>
+                </a:ext>
+              </a:extLst>
+            </a:blip>
+            <a:stretch>
+              <a:fillRect/>
+            </a:stretch>
+          </p:blipFill>
+          <p:spPr>
+            <a:xfrm>
+              <a:off x="5199410" y="2773608"/>
+              <a:ext cx="685799" cy="833192"/>
+            </a:xfrm>
+            <a:prstGeom prst="rect">
+              <a:avLst/>
+            </a:prstGeom>
+          </p:spPr>
+        </p:pic>
+        <p:pic>
+          <p:nvPicPr>
+            <p:cNvPr id="24" name="Imagem 23"/>
+            <p:cNvPicPr>
+              <a:picLocks noChangeAspect="1"/>
+            </p:cNvPicPr>
+            <p:nvPr/>
+          </p:nvPicPr>
+          <p:blipFill>
+            <a:blip r:embed="rId8" cstate="hqprint">
+              <a:extLst>
+                <a:ext uri="{28A0092B-C50C-407E-A947-70E740481C1C}">
+                  <a14:useLocalDpi xmlns:a14="http://schemas.microsoft.com/office/drawing/2010/main" val="0"/>
+                </a:ext>
+              </a:extLst>
+            </a:blip>
+            <a:stretch>
+              <a:fillRect/>
+            </a:stretch>
+          </p:blipFill>
+          <p:spPr>
+            <a:xfrm>
+              <a:off x="5851874" y="2773607"/>
+              <a:ext cx="417048" cy="417048"/>
+            </a:xfrm>
+            <a:prstGeom prst="rect">
+              <a:avLst/>
+            </a:prstGeom>
+          </p:spPr>
+        </p:pic>
+        <p:pic>
+          <p:nvPicPr>
+            <p:cNvPr id="25" name="Imagem 24"/>
+            <p:cNvPicPr>
+              <a:picLocks noChangeAspect="1"/>
+            </p:cNvPicPr>
+            <p:nvPr/>
+          </p:nvPicPr>
+          <p:blipFill>
+            <a:blip r:embed="rId9" cstate="hqprint">
+              <a:extLst>
+                <a:ext uri="{28A0092B-C50C-407E-A947-70E740481C1C}">
+                  <a14:useLocalDpi xmlns:a14="http://schemas.microsoft.com/office/drawing/2010/main" val="0"/>
+                </a:ext>
+              </a:extLst>
+            </a:blip>
+            <a:stretch>
+              <a:fillRect/>
+            </a:stretch>
+          </p:blipFill>
+          <p:spPr>
+            <a:xfrm>
+              <a:off x="5851874" y="3043261"/>
+              <a:ext cx="853726" cy="706496"/>
+            </a:xfrm>
+            <a:prstGeom prst="rect">
+              <a:avLst/>
+            </a:prstGeom>
+          </p:spPr>
+        </p:pic>
+        <p:pic>
+          <p:nvPicPr>
+            <p:cNvPr id="26" name="Imagem 25"/>
+            <p:cNvPicPr>
+              <a:picLocks noChangeAspect="1"/>
+            </p:cNvPicPr>
+            <p:nvPr/>
+          </p:nvPicPr>
+          <p:blipFill>
+            <a:blip r:embed="rId10" cstate="print">
+              <a:extLst>
+                <a:ext uri="{28A0092B-C50C-407E-A947-70E740481C1C}">
+                  <a14:useLocalDpi xmlns:a14="http://schemas.microsoft.com/office/drawing/2010/main" val="0"/>
+                </a:ext>
+              </a:extLst>
+            </a:blip>
+            <a:stretch>
+              <a:fillRect/>
+            </a:stretch>
+          </p:blipFill>
+          <p:spPr>
+            <a:xfrm>
+              <a:off x="6278737" y="2773607"/>
+              <a:ext cx="426863" cy="419307"/>
+            </a:xfrm>
+            <a:prstGeom prst="rect">
+              <a:avLst/>
+            </a:prstGeom>
+          </p:spPr>
+        </p:pic>
+      </p:grpSp>
+      <p:grpSp>
+        <p:nvGrpSpPr>
+          <p:cNvPr id="33" name="Agrupar 32"/>
+          <p:cNvGrpSpPr/>
+          <p:nvPr/>
+        </p:nvGrpSpPr>
+        <p:grpSpPr>
+          <a:xfrm>
+            <a:off x="2016791" y="3280505"/>
+            <a:ext cx="1003195" cy="972369"/>
+            <a:chOff x="6451600" y="5162699"/>
+            <a:chExt cx="1003195" cy="972369"/>
+          </a:xfrm>
+        </p:grpSpPr>
+        <p:pic>
+          <p:nvPicPr>
+            <p:cNvPr id="27" name="Imagem 26"/>
+            <p:cNvPicPr>
+              <a:picLocks noChangeAspect="1"/>
+            </p:cNvPicPr>
+            <p:nvPr/>
+          </p:nvPicPr>
+          <p:blipFill>
+            <a:blip r:embed="rId11" cstate="hqprint">
+              <a:extLst>
+                <a:ext uri="{28A0092B-C50C-407E-A947-70E740481C1C}">
+                  <a14:useLocalDpi xmlns:a14="http://schemas.microsoft.com/office/drawing/2010/main" val="0"/>
+                </a:ext>
+              </a:extLst>
+            </a:blip>
+            <a:stretch>
+              <a:fillRect/>
+            </a:stretch>
+          </p:blipFill>
+          <p:spPr>
+            <a:xfrm>
+              <a:off x="6451600" y="5351568"/>
+              <a:ext cx="783500" cy="783500"/>
+            </a:xfrm>
+            <a:prstGeom prst="rect">
+              <a:avLst/>
+            </a:prstGeom>
+          </p:spPr>
+        </p:pic>
+        <p:sp>
+          <p:nvSpPr>
+            <p:cNvPr id="28" name="Retângulo 27"/>
+            <p:cNvSpPr/>
+            <p:nvPr/>
+          </p:nvSpPr>
+          <p:spPr>
+            <a:xfrm>
+              <a:off x="6496890" y="5450319"/>
+              <a:ext cx="642345" cy="415348"/>
+            </a:xfrm>
+            <a:prstGeom prst="rect">
+              <a:avLst/>
+            </a:prstGeom>
+            <a:solidFill>
+              <a:schemeClr val="tx1">
+                <a:lumMod val="65000"/>
+                <a:lumOff val="35000"/>
+              </a:schemeClr>
+            </a:solidFill>
+          </p:spPr>
+          <p:style>
+            <a:lnRef idx="2">
+              <a:schemeClr val="accent1">
+                <a:shade val="50000"/>
+              </a:schemeClr>
+            </a:lnRef>
+            <a:fillRef idx="1">
+              <a:schemeClr val="accent1"/>
+            </a:fillRef>
+            <a:effectRef idx="0">
+              <a:schemeClr val="accent1"/>
+            </a:effectRef>
+            <a:fontRef idx="minor">
+              <a:schemeClr val="lt1"/>
+            </a:fontRef>
+          </p:style>
+          <p:txBody>
+            <a:bodyPr rtlCol="0" anchor="ctr"/>
+            <a:lstStyle/>
+            <a:p>
+              <a:pPr algn="ctr"/>
+              <a:endParaRPr lang="pt-BR"/>
+            </a:p>
+          </p:txBody>
+        </p:sp>
+        <p:pic>
+          <p:nvPicPr>
+            <p:cNvPr id="29" name="Imagem 28"/>
+            <p:cNvPicPr>
+              <a:picLocks noChangeAspect="1"/>
+            </p:cNvPicPr>
+            <p:nvPr/>
+          </p:nvPicPr>
+          <p:blipFill>
+            <a:blip r:embed="rId12" cstate="hqprint">
+              <a:extLst>
+                <a:ext uri="{28A0092B-C50C-407E-A947-70E740481C1C}">
+                  <a14:useLocalDpi xmlns:a14="http://schemas.microsoft.com/office/drawing/2010/main" val="0"/>
+                </a:ext>
+              </a:extLst>
+            </a:blip>
+            <a:stretch>
+              <a:fillRect/>
+            </a:stretch>
+          </p:blipFill>
+          <p:spPr>
+            <a:xfrm>
+              <a:off x="6886297" y="5162699"/>
+              <a:ext cx="568498" cy="531272"/>
+            </a:xfrm>
+            <a:prstGeom prst="rect">
+              <a:avLst/>
+            </a:prstGeom>
+          </p:spPr>
+        </p:pic>
+      </p:grpSp>
+      <p:pic>
+        <p:nvPicPr>
+          <p:cNvPr id="30" name="Imagem 29"/>
+          <p:cNvPicPr>
+            <a:picLocks noChangeAspect="1"/>
+          </p:cNvPicPr>
+          <p:nvPr/>
+        </p:nvPicPr>
+        <p:blipFill>
+          <a:blip r:embed="rId13" cstate="hqprint">
+            <a:extLst>
+              <a:ext uri="{28A0092B-C50C-407E-A947-70E740481C1C}">
+                <a14:useLocalDpi xmlns:a14="http://schemas.microsoft.com/office/drawing/2010/main" val="0"/>
+              </a:ext>
+            </a:extLst>
+          </a:blip>
+          <a:stretch>
+            <a:fillRect/>
+          </a:stretch>
+        </p:blipFill>
+        <p:spPr>
+          <a:xfrm>
+            <a:off x="1814395" y="3296833"/>
+            <a:ext cx="495371" cy="495371"/>
+          </a:xfrm>
+          <a:prstGeom prst="rect">
+            <a:avLst/>
+          </a:prstGeom>
+        </p:spPr>
+      </p:pic>
+      <p:pic>
+        <p:nvPicPr>
+          <p:cNvPr id="31" name="Imagem 30"/>
+          <p:cNvPicPr>
+            <a:picLocks noChangeAspect="1"/>
+          </p:cNvPicPr>
+          <p:nvPr/>
+        </p:nvPicPr>
+        <p:blipFill>
+          <a:blip r:embed="rId14" cstate="hqprint">
+            <a:extLst>
+              <a:ext uri="{28A0092B-C50C-407E-A947-70E740481C1C}">
+                <a14:useLocalDpi xmlns:a14="http://schemas.microsoft.com/office/drawing/2010/main" val="0"/>
+              </a:ext>
+            </a:extLst>
+          </a:blip>
+          <a:stretch>
+            <a:fillRect/>
+          </a:stretch>
+        </p:blipFill>
+        <p:spPr>
+          <a:xfrm>
+            <a:off x="591727" y="5583638"/>
+            <a:ext cx="711520" cy="711520"/>
+          </a:xfrm>
+          <a:prstGeom prst="rect">
+            <a:avLst/>
+          </a:prstGeom>
+        </p:spPr>
+      </p:pic>
+      <p:pic>
+        <p:nvPicPr>
+          <p:cNvPr id="32" name="Picture 2" descr="Meep School"/>
+          <p:cNvPicPr>
+            <a:picLocks noChangeAspect="1" noChangeArrowheads="1"/>
+          </p:cNvPicPr>
+          <p:nvPr/>
+        </p:nvPicPr>
+        <p:blipFill>
+          <a:blip r:embed="rId15" cstate="hqprint">
+            <a:extLst>
+              <a:ext uri="{28A0092B-C50C-407E-A947-70E740481C1C}">
+                <a14:useLocalDpi xmlns:a14="http://schemas.microsoft.com/office/drawing/2010/main" val="0"/>
+              </a:ext>
+            </a:extLst>
+          </a:blip>
+          <a:srcRect/>
+          <a:stretch>
+            <a:fillRect/>
+          </a:stretch>
+        </p:blipFill>
+        <p:spPr bwMode="auto">
+          <a:xfrm>
+            <a:off x="729387" y="4402321"/>
+            <a:ext cx="745549" cy="871574"/>
+          </a:xfrm>
+          <a:prstGeom prst="rect">
+            <a:avLst/>
+          </a:prstGeom>
+          <a:noFill/>
+          <a:extLst>
+            <a:ext uri="{909E8E84-426E-40DD-AFC4-6F175D3DCCD1}">
+              <a14:hiddenFill xmlns:a14="http://schemas.microsoft.com/office/drawing/2010/main">
+                <a:solidFill>
+                  <a:srgbClr val="FFFFFF"/>
+                </a:solidFill>
+              </a14:hiddenFill>
+            </a:ext>
+          </a:extLst>
+        </p:spPr>
+      </p:pic>
+      <p:sp>
+        <p:nvSpPr>
+          <p:cNvPr id="34" name="CaixaDeTexto 33"/>
+          <p:cNvSpPr txBox="1"/>
+          <p:nvPr/>
+        </p:nvSpPr>
+        <p:spPr>
+          <a:xfrm>
+            <a:off x="297587" y="6295158"/>
+            <a:ext cx="1282700" cy="461665"/>
+          </a:xfrm>
+          <a:prstGeom prst="rect">
+            <a:avLst/>
+          </a:prstGeom>
+          <a:noFill/>
+        </p:spPr>
+        <p:txBody>
+          <a:bodyPr wrap="square" rtlCol="0">
+            <a:spAutoFit/>
+          </a:bodyPr>
+          <a:lstStyle/>
+          <a:p>
+            <a:pPr algn="ctr"/>
+            <a:r>
+              <a:rPr lang="pt-BR" sz="1200" dirty="0" smtClean="0"/>
+              <a:t>Estabelecimento </a:t>
+            </a:r>
+          </a:p>
+          <a:p>
+            <a:pPr algn="ctr"/>
+            <a:r>
+              <a:rPr lang="pt-BR" sz="1200" dirty="0" err="1" smtClean="0"/>
+              <a:t>Fast</a:t>
+            </a:r>
+            <a:r>
+              <a:rPr lang="pt-BR" sz="1200" dirty="0" smtClean="0"/>
+              <a:t> </a:t>
+            </a:r>
+            <a:r>
+              <a:rPr lang="pt-BR" sz="1200" dirty="0" err="1" smtClean="0"/>
+              <a:t>Food</a:t>
+            </a:r>
+            <a:endParaRPr lang="pt-BR" sz="1200" dirty="0"/>
+          </a:p>
+        </p:txBody>
+      </p:sp>
+      <p:pic>
+        <p:nvPicPr>
+          <p:cNvPr id="35" name="Imagem 34"/>
+          <p:cNvPicPr>
+            <a:picLocks noChangeAspect="1"/>
+          </p:cNvPicPr>
+          <p:nvPr/>
+        </p:nvPicPr>
+        <p:blipFill>
+          <a:blip r:embed="rId16" cstate="print">
+            <a:extLst>
+              <a:ext uri="{28A0092B-C50C-407E-A947-70E740481C1C}">
+                <a14:useLocalDpi xmlns:a14="http://schemas.microsoft.com/office/drawing/2010/main" val="0"/>
+              </a:ext>
+            </a:extLst>
+          </a:blip>
+          <a:stretch>
+            <a:fillRect/>
+          </a:stretch>
+        </p:blipFill>
+        <p:spPr>
+          <a:xfrm rot="2923920">
+            <a:off x="3086009" y="2913526"/>
+            <a:ext cx="366979" cy="366979"/>
+          </a:xfrm>
+          <a:prstGeom prst="rect">
+            <a:avLst/>
+          </a:prstGeom>
+        </p:spPr>
+      </p:pic>
+      <p:pic>
+        <p:nvPicPr>
+          <p:cNvPr id="36" name="Imagem 35"/>
+          <p:cNvPicPr>
+            <a:picLocks noChangeAspect="1"/>
+          </p:cNvPicPr>
+          <p:nvPr/>
+        </p:nvPicPr>
+        <p:blipFill>
+          <a:blip r:embed="rId17" cstate="hqprint">
+            <a:extLst>
+              <a:ext uri="{28A0092B-C50C-407E-A947-70E740481C1C}">
+                <a14:useLocalDpi xmlns:a14="http://schemas.microsoft.com/office/drawing/2010/main" val="0"/>
+              </a:ext>
+            </a:extLst>
+          </a:blip>
+          <a:stretch>
+            <a:fillRect/>
+          </a:stretch>
+        </p:blipFill>
+        <p:spPr>
+          <a:xfrm>
+            <a:off x="3712174" y="2130636"/>
+            <a:ext cx="728474" cy="728474"/>
+          </a:xfrm>
+          <a:prstGeom prst="rect">
+            <a:avLst/>
+          </a:prstGeom>
+        </p:spPr>
+      </p:pic>
+      <p:pic>
+        <p:nvPicPr>
+          <p:cNvPr id="37" name="Imagem 36"/>
+          <p:cNvPicPr>
+            <a:picLocks noChangeAspect="1"/>
+          </p:cNvPicPr>
+          <p:nvPr/>
+        </p:nvPicPr>
+        <p:blipFill>
+          <a:blip r:embed="rId16" cstate="print">
+            <a:extLst>
+              <a:ext uri="{28A0092B-C50C-407E-A947-70E740481C1C}">
+                <a14:useLocalDpi xmlns:a14="http://schemas.microsoft.com/office/drawing/2010/main" val="0"/>
+              </a:ext>
+            </a:extLst>
+          </a:blip>
+          <a:stretch>
+            <a:fillRect/>
+          </a:stretch>
+        </p:blipFill>
+        <p:spPr>
+          <a:xfrm rot="8281448">
+            <a:off x="8793162" y="2913407"/>
+            <a:ext cx="366979" cy="366979"/>
+          </a:xfrm>
+          <a:prstGeom prst="rect">
+            <a:avLst/>
+          </a:prstGeom>
+        </p:spPr>
+      </p:pic>
+      <p:pic>
+        <p:nvPicPr>
+          <p:cNvPr id="38" name="Imagem 37"/>
+          <p:cNvPicPr>
+            <a:picLocks noChangeAspect="1"/>
+          </p:cNvPicPr>
+          <p:nvPr/>
+        </p:nvPicPr>
+        <p:blipFill>
+          <a:blip r:embed="rId17" cstate="hqprint">
+            <a:extLst>
+              <a:ext uri="{28A0092B-C50C-407E-A947-70E740481C1C}">
+                <a14:useLocalDpi xmlns:a14="http://schemas.microsoft.com/office/drawing/2010/main" val="0"/>
+              </a:ext>
+            </a:extLst>
+          </a:blip>
+          <a:stretch>
+            <a:fillRect/>
+          </a:stretch>
+        </p:blipFill>
+        <p:spPr>
+          <a:xfrm>
+            <a:off x="7805621" y="2172590"/>
+            <a:ext cx="728474" cy="728474"/>
+          </a:xfrm>
+          <a:prstGeom prst="rect">
+            <a:avLst/>
+          </a:prstGeom>
+        </p:spPr>
+      </p:pic>
+      <p:pic>
+        <p:nvPicPr>
+          <p:cNvPr id="39" name="Imagem 38"/>
+          <p:cNvPicPr>
+            <a:picLocks noChangeAspect="1"/>
+          </p:cNvPicPr>
+          <p:nvPr/>
+        </p:nvPicPr>
+        <p:blipFill>
+          <a:blip r:embed="rId18" cstate="hqprint">
+            <a:extLst>
+              <a:ext uri="{28A0092B-C50C-407E-A947-70E740481C1C}">
+                <a14:useLocalDpi xmlns:a14="http://schemas.microsoft.com/office/drawing/2010/main" val="0"/>
+              </a:ext>
+            </a:extLst>
+          </a:blip>
+          <a:stretch>
+            <a:fillRect/>
+          </a:stretch>
+        </p:blipFill>
+        <p:spPr>
+          <a:xfrm>
+            <a:off x="9485229" y="3390352"/>
+            <a:ext cx="803704" cy="803704"/>
+          </a:xfrm>
+          <a:prstGeom prst="rect">
+            <a:avLst/>
+          </a:prstGeom>
+        </p:spPr>
+      </p:pic>
+      <p:grpSp>
+        <p:nvGrpSpPr>
+          <p:cNvPr id="47" name="Agrupar 46"/>
+          <p:cNvGrpSpPr/>
+          <p:nvPr/>
+        </p:nvGrpSpPr>
+        <p:grpSpPr>
+          <a:xfrm>
+            <a:off x="10706100" y="3519734"/>
+            <a:ext cx="1158411" cy="2991226"/>
+            <a:chOff x="10426860" y="1621504"/>
+            <a:chExt cx="1143970" cy="2991226"/>
+          </a:xfrm>
+        </p:grpSpPr>
+        <p:pic>
+          <p:nvPicPr>
+            <p:cNvPr id="48" name="Imagem 47"/>
+            <p:cNvPicPr>
+              <a:picLocks noChangeAspect="1"/>
+            </p:cNvPicPr>
+            <p:nvPr/>
+          </p:nvPicPr>
+          <p:blipFill>
+            <a:blip r:embed="rId19" cstate="hqprint">
+              <a:extLst>
+                <a:ext uri="{28A0092B-C50C-407E-A947-70E740481C1C}">
+                  <a14:useLocalDpi xmlns:a14="http://schemas.microsoft.com/office/drawing/2010/main" val="0"/>
+                </a:ext>
+              </a:extLst>
+            </a:blip>
+            <a:stretch>
+              <a:fillRect/>
+            </a:stretch>
+          </p:blipFill>
+          <p:spPr>
+            <a:xfrm>
+              <a:off x="10530041" y="1621504"/>
+              <a:ext cx="825195" cy="825195"/>
+            </a:xfrm>
+            <a:prstGeom prst="rect">
+              <a:avLst/>
+            </a:prstGeom>
+          </p:spPr>
+        </p:pic>
+        <p:pic>
+          <p:nvPicPr>
+            <p:cNvPr id="49" name="Imagem 48"/>
+            <p:cNvPicPr>
+              <a:picLocks noChangeAspect="1"/>
+            </p:cNvPicPr>
+            <p:nvPr/>
+          </p:nvPicPr>
+          <p:blipFill>
+            <a:blip r:embed="rId20" cstate="hqprint">
+              <a:extLst>
+                <a:ext uri="{28A0092B-C50C-407E-A947-70E740481C1C}">
+                  <a14:useLocalDpi xmlns:a14="http://schemas.microsoft.com/office/drawing/2010/main" val="0"/>
+                </a:ext>
+              </a:extLst>
+            </a:blip>
+            <a:stretch>
+              <a:fillRect/>
+            </a:stretch>
+          </p:blipFill>
+          <p:spPr>
+            <a:xfrm>
+              <a:off x="10426860" y="2742611"/>
+              <a:ext cx="928376" cy="814878"/>
+            </a:xfrm>
+            <a:prstGeom prst="rect">
+              <a:avLst/>
+            </a:prstGeom>
+          </p:spPr>
+        </p:pic>
+        <p:grpSp>
+          <p:nvGrpSpPr>
+            <p:cNvPr id="50" name="Agrupar 49"/>
+            <p:cNvGrpSpPr/>
+            <p:nvPr/>
+          </p:nvGrpSpPr>
+          <p:grpSpPr>
+            <a:xfrm>
+              <a:off x="10971871" y="2592596"/>
+              <a:ext cx="598959" cy="562765"/>
+              <a:chOff x="7886700" y="5219700"/>
+              <a:chExt cx="1612900" cy="1612900"/>
+            </a:xfrm>
+          </p:grpSpPr>
+          <p:pic>
+            <p:nvPicPr>
+              <p:cNvPr id="52" name="Imagem 51"/>
+              <p:cNvPicPr>
+                <a:picLocks noChangeAspect="1"/>
+              </p:cNvPicPr>
+              <p:nvPr/>
+            </p:nvPicPr>
+            <p:blipFill>
+              <a:blip r:embed="rId21" cstate="hqprint">
+                <a:extLst>
+                  <a:ext uri="{28A0092B-C50C-407E-A947-70E740481C1C}">
+                    <a14:useLocalDpi xmlns:a14="http://schemas.microsoft.com/office/drawing/2010/main" val="0"/>
+                  </a:ext>
+                </a:extLst>
+              </a:blip>
+              <a:stretch>
+                <a:fillRect/>
+              </a:stretch>
+            </p:blipFill>
+            <p:spPr>
+              <a:xfrm>
+                <a:off x="8039100" y="5372100"/>
+                <a:ext cx="1307693" cy="1307693"/>
+              </a:xfrm>
+              <a:prstGeom prst="rect">
+                <a:avLst/>
+              </a:prstGeom>
+            </p:spPr>
+          </p:pic>
+          <p:pic>
+            <p:nvPicPr>
+              <p:cNvPr id="53" name="Imagem 52"/>
+              <p:cNvPicPr>
+                <a:picLocks noChangeAspect="1"/>
+              </p:cNvPicPr>
+              <p:nvPr/>
+            </p:nvPicPr>
+            <p:blipFill>
+              <a:blip r:embed="rId22" cstate="hqprint">
+                <a:extLst>
+                  <a:ext uri="{28A0092B-C50C-407E-A947-70E740481C1C}">
+                    <a14:useLocalDpi xmlns:a14="http://schemas.microsoft.com/office/drawing/2010/main" val="0"/>
+                  </a:ext>
+                </a:extLst>
+              </a:blip>
+              <a:stretch>
+                <a:fillRect/>
+              </a:stretch>
+            </p:blipFill>
+            <p:spPr>
+              <a:xfrm>
+                <a:off x="7886700" y="5219700"/>
+                <a:ext cx="1612900" cy="1612900"/>
+              </a:xfrm>
+              <a:prstGeom prst="rect">
+                <a:avLst/>
+              </a:prstGeom>
+            </p:spPr>
+          </p:pic>
+        </p:grpSp>
+        <p:pic>
+          <p:nvPicPr>
+            <p:cNvPr id="51" name="Imagem 50"/>
+            <p:cNvPicPr>
+              <a:picLocks noChangeAspect="1"/>
+            </p:cNvPicPr>
+            <p:nvPr/>
+          </p:nvPicPr>
+          <p:blipFill>
+            <a:blip r:embed="rId23" cstate="hqprint">
+              <a:extLst>
+                <a:ext uri="{28A0092B-C50C-407E-A947-70E740481C1C}">
+                  <a14:useLocalDpi xmlns:a14="http://schemas.microsoft.com/office/drawing/2010/main" val="0"/>
+                </a:ext>
+              </a:extLst>
+            </a:blip>
+            <a:stretch>
+              <a:fillRect/>
+            </a:stretch>
+          </p:blipFill>
+          <p:spPr>
+            <a:xfrm>
+              <a:off x="10552661" y="3902495"/>
+              <a:ext cx="779954" cy="710235"/>
+            </a:xfrm>
+            <a:prstGeom prst="rect">
+              <a:avLst/>
+            </a:prstGeom>
+          </p:spPr>
+        </p:pic>
+      </p:grpSp>
+    </p:spTree>
+    <p:extLst>
+      <p:ext uri="{BB962C8B-B14F-4D97-AF65-F5344CB8AC3E}">
+        <p14:creationId xmlns:p14="http://schemas.microsoft.com/office/powerpoint/2010/main" val="2141106713"/>
+      </p:ext>
+    </p:extLst>
+  </p:cSld>
+  <p:clrMapOvr>
+    <a:masterClrMapping/>
+  </p:clrMapOvr>
+</p:sld>
+</file>
+
+<file path=ppt/slides/slide3.xml><?xml version="1.0" encoding="utf-8"?>
+<p:sld xmlns:a="http://schemas.openxmlformats.org/drawingml/2006/main" xmlns:r="http://schemas.openxmlformats.org/officeDocument/2006/relationships" xmlns:p="http://schemas.openxmlformats.org/presentationml/2006/main">
+  <p:cSld>
+    <p:spTree>
+      <p:nvGrpSpPr>
+        <p:cNvPr id="1" name=""/>
+        <p:cNvGrpSpPr/>
+        <p:nvPr/>
+      </p:nvGrpSpPr>
+      <p:grpSpPr>
+        <a:xfrm>
+          <a:off x="0" y="0"/>
+          <a:ext cx="0" cy="0"/>
+          <a:chOff x="0" y="0"/>
+          <a:chExt cx="0" cy="0"/>
+        </a:xfrm>
+      </p:grpSpPr>
       <p:sp>
         <p:nvSpPr>
           <p:cNvPr id="4" name="CaixaDeTexto 3">
@@ -3476,6 +4411,704 @@
     <p:extLst>
       <p:ext uri="{BB962C8B-B14F-4D97-AF65-F5344CB8AC3E}">
         <p14:creationId xmlns:p14="http://schemas.microsoft.com/office/powerpoint/2010/main" val="112595272"/>
+      </p:ext>
+    </p:extLst>
+  </p:cSld>
+  <p:clrMapOvr>
+    <a:masterClrMapping/>
+  </p:clrMapOvr>
+</p:sld>
+</file>
+
+<file path=ppt/slides/slide4.xml><?xml version="1.0" encoding="utf-8"?>
+<p:sld xmlns:a="http://schemas.openxmlformats.org/drawingml/2006/main" xmlns:r="http://schemas.openxmlformats.org/officeDocument/2006/relationships" xmlns:p="http://schemas.openxmlformats.org/presentationml/2006/main">
+  <p:cSld>
+    <p:spTree>
+      <p:nvGrpSpPr>
+        <p:cNvPr id="1" name=""/>
+        <p:cNvGrpSpPr/>
+        <p:nvPr/>
+      </p:nvGrpSpPr>
+      <p:grpSpPr>
+        <a:xfrm>
+          <a:off x="0" y="0"/>
+          <a:ext cx="0" cy="0"/>
+          <a:chOff x="0" y="0"/>
+          <a:chExt cx="0" cy="0"/>
+        </a:xfrm>
+      </p:grpSpPr>
+      <p:pic>
+        <p:nvPicPr>
+          <p:cNvPr id="4" name="Imagem 3"/>
+          <p:cNvPicPr>
+            <a:picLocks noChangeAspect="1"/>
+          </p:cNvPicPr>
+          <p:nvPr/>
+        </p:nvPicPr>
+        <p:blipFill>
+          <a:blip r:embed="rId2" cstate="hqprint">
+            <a:extLst>
+              <a:ext uri="{28A0092B-C50C-407E-A947-70E740481C1C}">
+                <a14:useLocalDpi xmlns:a14="http://schemas.microsoft.com/office/drawing/2010/main" val="0"/>
+              </a:ext>
+            </a:extLst>
+          </a:blip>
+          <a:stretch>
+            <a:fillRect/>
+          </a:stretch>
+        </p:blipFill>
+        <p:spPr>
+          <a:xfrm>
+            <a:off x="749300" y="2552700"/>
+            <a:ext cx="1320799" cy="1320799"/>
+          </a:xfrm>
+          <a:prstGeom prst="rect">
+            <a:avLst/>
+          </a:prstGeom>
+        </p:spPr>
+      </p:pic>
+      <p:pic>
+        <p:nvPicPr>
+          <p:cNvPr id="1026" name="Picture 2" descr="Meep School"/>
+          <p:cNvPicPr>
+            <a:picLocks noChangeAspect="1" noChangeArrowheads="1"/>
+          </p:cNvPicPr>
+          <p:nvPr/>
+        </p:nvPicPr>
+        <p:blipFill>
+          <a:blip r:embed="rId3">
+            <a:extLst>
+              <a:ext uri="{28A0092B-C50C-407E-A947-70E740481C1C}">
+                <a14:useLocalDpi xmlns:a14="http://schemas.microsoft.com/office/drawing/2010/main" val="0"/>
+              </a:ext>
+            </a:extLst>
+          </a:blip>
+          <a:srcRect/>
+          <a:stretch>
+            <a:fillRect/>
+          </a:stretch>
+        </p:blipFill>
+        <p:spPr bwMode="auto">
+          <a:xfrm>
+            <a:off x="3197337" y="2446699"/>
+            <a:ext cx="1311163" cy="1532799"/>
+          </a:xfrm>
+          <a:prstGeom prst="rect">
+            <a:avLst/>
+          </a:prstGeom>
+          <a:noFill/>
+          <a:extLst>
+            <a:ext uri="{909E8E84-426E-40DD-AFC4-6F175D3DCCD1}">
+              <a14:hiddenFill xmlns:a14="http://schemas.microsoft.com/office/drawing/2010/main">
+                <a:solidFill>
+                  <a:srgbClr val="FFFFFF"/>
+                </a:solidFill>
+              </a14:hiddenFill>
+            </a:ext>
+          </a:extLst>
+        </p:spPr>
+      </p:pic>
+      <p:pic>
+        <p:nvPicPr>
+          <p:cNvPr id="12" name="Imagem 11"/>
+          <p:cNvPicPr>
+            <a:picLocks noChangeAspect="1"/>
+          </p:cNvPicPr>
+          <p:nvPr/>
+        </p:nvPicPr>
+        <p:blipFill>
+          <a:blip r:embed="rId4" cstate="hqprint">
+            <a:extLst>
+              <a:ext uri="{28A0092B-C50C-407E-A947-70E740481C1C}">
+                <a14:useLocalDpi xmlns:a14="http://schemas.microsoft.com/office/drawing/2010/main" val="0"/>
+              </a:ext>
+            </a:extLst>
+          </a:blip>
+          <a:stretch>
+            <a:fillRect/>
+          </a:stretch>
+        </p:blipFill>
+        <p:spPr>
+          <a:xfrm>
+            <a:off x="5613978" y="2552700"/>
+            <a:ext cx="1300594" cy="1243011"/>
+          </a:xfrm>
+          <a:prstGeom prst="rect">
+            <a:avLst/>
+          </a:prstGeom>
+        </p:spPr>
+      </p:pic>
+      <p:pic>
+        <p:nvPicPr>
+          <p:cNvPr id="13" name="Imagem 12"/>
+          <p:cNvPicPr>
+            <a:picLocks noChangeAspect="1"/>
+          </p:cNvPicPr>
+          <p:nvPr/>
+        </p:nvPicPr>
+        <p:blipFill>
+          <a:blip r:embed="rId5">
+            <a:extLst>
+              <a:ext uri="{28A0092B-C50C-407E-A947-70E740481C1C}">
+                <a14:useLocalDpi xmlns:a14="http://schemas.microsoft.com/office/drawing/2010/main" val="0"/>
+              </a:ext>
+            </a:extLst>
+          </a:blip>
+          <a:stretch>
+            <a:fillRect/>
+          </a:stretch>
+        </p:blipFill>
+        <p:spPr>
+          <a:xfrm>
+            <a:off x="7941409" y="2340700"/>
+            <a:ext cx="1561795" cy="1561795"/>
+          </a:xfrm>
+          <a:prstGeom prst="rect">
+            <a:avLst/>
+          </a:prstGeom>
+        </p:spPr>
+      </p:pic>
+      <p:pic>
+        <p:nvPicPr>
+          <p:cNvPr id="24" name="Imagem 23"/>
+          <p:cNvPicPr>
+            <a:picLocks noChangeAspect="1"/>
+          </p:cNvPicPr>
+          <p:nvPr/>
+        </p:nvPicPr>
+        <p:blipFill>
+          <a:blip r:embed="rId6" cstate="hqprint">
+            <a:extLst>
+              <a:ext uri="{28A0092B-C50C-407E-A947-70E740481C1C}">
+                <a14:useLocalDpi xmlns:a14="http://schemas.microsoft.com/office/drawing/2010/main" val="0"/>
+              </a:ext>
+            </a:extLst>
+          </a:blip>
+          <a:stretch>
+            <a:fillRect/>
+          </a:stretch>
+        </p:blipFill>
+        <p:spPr>
+          <a:xfrm>
+            <a:off x="2316833" y="2893672"/>
+            <a:ext cx="674928" cy="674928"/>
+          </a:xfrm>
+          <a:prstGeom prst="rect">
+            <a:avLst/>
+          </a:prstGeom>
+        </p:spPr>
+      </p:pic>
+      <p:pic>
+        <p:nvPicPr>
+          <p:cNvPr id="26" name="Imagem 25"/>
+          <p:cNvPicPr>
+            <a:picLocks noChangeAspect="1"/>
+          </p:cNvPicPr>
+          <p:nvPr/>
+        </p:nvPicPr>
+        <p:blipFill>
+          <a:blip r:embed="rId6" cstate="hqprint">
+            <a:extLst>
+              <a:ext uri="{28A0092B-C50C-407E-A947-70E740481C1C}">
+                <a14:useLocalDpi xmlns:a14="http://schemas.microsoft.com/office/drawing/2010/main" val="0"/>
+              </a:ext>
+            </a:extLst>
+          </a:blip>
+          <a:stretch>
+            <a:fillRect/>
+          </a:stretch>
+        </p:blipFill>
+        <p:spPr>
+          <a:xfrm>
+            <a:off x="4667685" y="2882561"/>
+            <a:ext cx="674928" cy="674928"/>
+          </a:xfrm>
+          <a:prstGeom prst="rect">
+            <a:avLst/>
+          </a:prstGeom>
+        </p:spPr>
+      </p:pic>
+      <p:pic>
+        <p:nvPicPr>
+          <p:cNvPr id="28" name="Imagem 27"/>
+          <p:cNvPicPr>
+            <a:picLocks noChangeAspect="1"/>
+          </p:cNvPicPr>
+          <p:nvPr/>
+        </p:nvPicPr>
+        <p:blipFill>
+          <a:blip r:embed="rId6" cstate="hqprint">
+            <a:extLst>
+              <a:ext uri="{28A0092B-C50C-407E-A947-70E740481C1C}">
+                <a14:useLocalDpi xmlns:a14="http://schemas.microsoft.com/office/drawing/2010/main" val="0"/>
+              </a:ext>
+            </a:extLst>
+          </a:blip>
+          <a:stretch>
+            <a:fillRect/>
+          </a:stretch>
+        </p:blipFill>
+        <p:spPr>
+          <a:xfrm>
+            <a:off x="7122119" y="2873908"/>
+            <a:ext cx="674928" cy="674928"/>
+          </a:xfrm>
+          <a:prstGeom prst="rect">
+            <a:avLst/>
+          </a:prstGeom>
+        </p:spPr>
+      </p:pic>
+      <p:pic>
+        <p:nvPicPr>
+          <p:cNvPr id="29" name="Imagem 28"/>
+          <p:cNvPicPr>
+            <a:picLocks noChangeAspect="1"/>
+          </p:cNvPicPr>
+          <p:nvPr/>
+        </p:nvPicPr>
+        <p:blipFill>
+          <a:blip r:embed="rId6" cstate="hqprint">
+            <a:extLst>
+              <a:ext uri="{28A0092B-C50C-407E-A947-70E740481C1C}">
+                <a14:useLocalDpi xmlns:a14="http://schemas.microsoft.com/office/drawing/2010/main" val="0"/>
+              </a:ext>
+            </a:extLst>
+          </a:blip>
+          <a:stretch>
+            <a:fillRect/>
+          </a:stretch>
+        </p:blipFill>
+        <p:spPr>
+          <a:xfrm>
+            <a:off x="9551366" y="2645771"/>
+            <a:ext cx="674928" cy="674928"/>
+          </a:xfrm>
+          <a:prstGeom prst="rect">
+            <a:avLst/>
+          </a:prstGeom>
+        </p:spPr>
+      </p:pic>
+      <p:sp>
+        <p:nvSpPr>
+          <p:cNvPr id="25" name="Retângulo 24"/>
+          <p:cNvSpPr/>
+          <p:nvPr/>
+        </p:nvSpPr>
+        <p:spPr>
+          <a:xfrm>
+            <a:off x="10347480" y="1256035"/>
+            <a:ext cx="1450819" cy="3454400"/>
+          </a:xfrm>
+          <a:prstGeom prst="rect">
+            <a:avLst/>
+          </a:prstGeom>
+          <a:solidFill>
+            <a:schemeClr val="bg1"/>
+          </a:solidFill>
+          <a:ln>
+            <a:solidFill>
+              <a:schemeClr val="tx1">
+                <a:lumMod val="95000"/>
+                <a:lumOff val="5000"/>
+              </a:schemeClr>
+            </a:solidFill>
+          </a:ln>
+          <a:effectLst>
+            <a:outerShdw blurRad="50800" dist="38100" dir="2700000" algn="tl" rotWithShape="0">
+              <a:prstClr val="black">
+                <a:alpha val="40000"/>
+              </a:prstClr>
+            </a:outerShdw>
+          </a:effectLst>
+        </p:spPr>
+        <p:style>
+          <a:lnRef idx="2">
+            <a:schemeClr val="accent1">
+              <a:shade val="50000"/>
+            </a:schemeClr>
+          </a:lnRef>
+          <a:fillRef idx="1">
+            <a:schemeClr val="accent1"/>
+          </a:fillRef>
+          <a:effectRef idx="0">
+            <a:schemeClr val="accent1"/>
+          </a:effectRef>
+          <a:fontRef idx="minor">
+            <a:schemeClr val="lt1"/>
+          </a:fontRef>
+        </p:style>
+        <p:txBody>
+          <a:bodyPr rtlCol="0" anchor="ctr"/>
+          <a:lstStyle/>
+          <a:p>
+            <a:pPr algn="ctr"/>
+            <a:endParaRPr lang="pt-BR"/>
+          </a:p>
+        </p:txBody>
+      </p:sp>
+      <p:grpSp>
+        <p:nvGrpSpPr>
+          <p:cNvPr id="30" name="Agrupar 29"/>
+          <p:cNvGrpSpPr/>
+          <p:nvPr/>
+        </p:nvGrpSpPr>
+        <p:grpSpPr>
+          <a:xfrm>
+            <a:off x="10530041" y="1487622"/>
+            <a:ext cx="1143970" cy="2991226"/>
+            <a:chOff x="10426860" y="1621504"/>
+            <a:chExt cx="1143970" cy="2991226"/>
+          </a:xfrm>
+        </p:grpSpPr>
+        <p:pic>
+          <p:nvPicPr>
+            <p:cNvPr id="37" name="Imagem 36"/>
+            <p:cNvPicPr>
+              <a:picLocks noChangeAspect="1"/>
+            </p:cNvPicPr>
+            <p:nvPr/>
+          </p:nvPicPr>
+          <p:blipFill>
+            <a:blip r:embed="rId7" cstate="hqprint">
+              <a:extLst>
+                <a:ext uri="{28A0092B-C50C-407E-A947-70E740481C1C}">
+                  <a14:useLocalDpi xmlns:a14="http://schemas.microsoft.com/office/drawing/2010/main" val="0"/>
+                </a:ext>
+              </a:extLst>
+            </a:blip>
+            <a:stretch>
+              <a:fillRect/>
+            </a:stretch>
+          </p:blipFill>
+          <p:spPr>
+            <a:xfrm>
+              <a:off x="10530041" y="1621504"/>
+              <a:ext cx="825195" cy="825195"/>
+            </a:xfrm>
+            <a:prstGeom prst="rect">
+              <a:avLst/>
+            </a:prstGeom>
+          </p:spPr>
+        </p:pic>
+        <p:pic>
+          <p:nvPicPr>
+            <p:cNvPr id="38" name="Imagem 37"/>
+            <p:cNvPicPr>
+              <a:picLocks noChangeAspect="1"/>
+            </p:cNvPicPr>
+            <p:nvPr/>
+          </p:nvPicPr>
+          <p:blipFill>
+            <a:blip r:embed="rId8" cstate="hqprint">
+              <a:extLst>
+                <a:ext uri="{28A0092B-C50C-407E-A947-70E740481C1C}">
+                  <a14:useLocalDpi xmlns:a14="http://schemas.microsoft.com/office/drawing/2010/main" val="0"/>
+                </a:ext>
+              </a:extLst>
+            </a:blip>
+            <a:stretch>
+              <a:fillRect/>
+            </a:stretch>
+          </p:blipFill>
+          <p:spPr>
+            <a:xfrm>
+              <a:off x="10426860" y="2742611"/>
+              <a:ext cx="928376" cy="814878"/>
+            </a:xfrm>
+            <a:prstGeom prst="rect">
+              <a:avLst/>
+            </a:prstGeom>
+          </p:spPr>
+        </p:pic>
+        <p:grpSp>
+          <p:nvGrpSpPr>
+            <p:cNvPr id="39" name="Agrupar 38"/>
+            <p:cNvGrpSpPr/>
+            <p:nvPr/>
+          </p:nvGrpSpPr>
+          <p:grpSpPr>
+            <a:xfrm>
+              <a:off x="10971871" y="2592596"/>
+              <a:ext cx="598959" cy="562765"/>
+              <a:chOff x="7886700" y="5219700"/>
+              <a:chExt cx="1612900" cy="1612900"/>
+            </a:xfrm>
+          </p:grpSpPr>
+          <p:pic>
+            <p:nvPicPr>
+              <p:cNvPr id="40" name="Imagem 39"/>
+              <p:cNvPicPr>
+                <a:picLocks noChangeAspect="1"/>
+              </p:cNvPicPr>
+              <p:nvPr/>
+            </p:nvPicPr>
+            <p:blipFill>
+              <a:blip r:embed="rId9" cstate="hqprint">
+                <a:extLst>
+                  <a:ext uri="{28A0092B-C50C-407E-A947-70E740481C1C}">
+                    <a14:useLocalDpi xmlns:a14="http://schemas.microsoft.com/office/drawing/2010/main" val="0"/>
+                  </a:ext>
+                </a:extLst>
+              </a:blip>
+              <a:stretch>
+                <a:fillRect/>
+              </a:stretch>
+            </p:blipFill>
+            <p:spPr>
+              <a:xfrm>
+                <a:off x="8039100" y="5372100"/>
+                <a:ext cx="1307693" cy="1307693"/>
+              </a:xfrm>
+              <a:prstGeom prst="rect">
+                <a:avLst/>
+              </a:prstGeom>
+            </p:spPr>
+          </p:pic>
+          <p:pic>
+            <p:nvPicPr>
+              <p:cNvPr id="41" name="Imagem 40"/>
+              <p:cNvPicPr>
+                <a:picLocks noChangeAspect="1"/>
+              </p:cNvPicPr>
+              <p:nvPr/>
+            </p:nvPicPr>
+            <p:blipFill>
+              <a:blip r:embed="rId10" cstate="hqprint">
+                <a:extLst>
+                  <a:ext uri="{28A0092B-C50C-407E-A947-70E740481C1C}">
+                    <a14:useLocalDpi xmlns:a14="http://schemas.microsoft.com/office/drawing/2010/main" val="0"/>
+                  </a:ext>
+                </a:extLst>
+              </a:blip>
+              <a:stretch>
+                <a:fillRect/>
+              </a:stretch>
+            </p:blipFill>
+            <p:spPr>
+              <a:xfrm>
+                <a:off x="7886700" y="5219700"/>
+                <a:ext cx="1612900" cy="1612900"/>
+              </a:xfrm>
+              <a:prstGeom prst="rect">
+                <a:avLst/>
+              </a:prstGeom>
+            </p:spPr>
+          </p:pic>
+        </p:grpSp>
+        <p:pic>
+          <p:nvPicPr>
+            <p:cNvPr id="42" name="Imagem 41"/>
+            <p:cNvPicPr>
+              <a:picLocks noChangeAspect="1"/>
+            </p:cNvPicPr>
+            <p:nvPr/>
+          </p:nvPicPr>
+          <p:blipFill>
+            <a:blip r:embed="rId11" cstate="hqprint">
+              <a:extLst>
+                <a:ext uri="{28A0092B-C50C-407E-A947-70E740481C1C}">
+                  <a14:useLocalDpi xmlns:a14="http://schemas.microsoft.com/office/drawing/2010/main" val="0"/>
+                </a:ext>
+              </a:extLst>
+            </a:blip>
+            <a:stretch>
+              <a:fillRect/>
+            </a:stretch>
+          </p:blipFill>
+          <p:spPr>
+            <a:xfrm>
+              <a:off x="10552661" y="3902495"/>
+              <a:ext cx="779954" cy="710235"/>
+            </a:xfrm>
+            <a:prstGeom prst="rect">
+              <a:avLst/>
+            </a:prstGeom>
+          </p:spPr>
+        </p:pic>
+      </p:grpSp>
+      <p:sp>
+        <p:nvSpPr>
+          <p:cNvPr id="43" name="CaixaDeTexto 42"/>
+          <p:cNvSpPr txBox="1"/>
+          <p:nvPr/>
+        </p:nvSpPr>
+        <p:spPr>
+          <a:xfrm>
+            <a:off x="568763" y="3939064"/>
+            <a:ext cx="1748070" cy="369332"/>
+          </a:xfrm>
+          <a:prstGeom prst="rect">
+            <a:avLst/>
+          </a:prstGeom>
+          <a:noFill/>
+        </p:spPr>
+        <p:txBody>
+          <a:bodyPr wrap="square" rtlCol="0">
+            <a:spAutoFit/>
+          </a:bodyPr>
+          <a:lstStyle/>
+          <a:p>
+            <a:r>
+              <a:rPr lang="pt-BR" dirty="0" smtClean="0"/>
+              <a:t>Estabelecimento</a:t>
+            </a:r>
+            <a:endParaRPr lang="pt-BR" dirty="0"/>
+          </a:p>
+        </p:txBody>
+      </p:sp>
+      <p:sp>
+        <p:nvSpPr>
+          <p:cNvPr id="45" name="CaixaDeTexto 44"/>
+          <p:cNvSpPr txBox="1"/>
+          <p:nvPr/>
+        </p:nvSpPr>
+        <p:spPr>
+          <a:xfrm>
+            <a:off x="2654297" y="3939064"/>
+            <a:ext cx="1996637" cy="646331"/>
+          </a:xfrm>
+          <a:prstGeom prst="rect">
+            <a:avLst/>
+          </a:prstGeom>
+          <a:noFill/>
+        </p:spPr>
+        <p:txBody>
+          <a:bodyPr wrap="square" rtlCol="0">
+            <a:spAutoFit/>
+          </a:bodyPr>
+          <a:lstStyle/>
+          <a:p>
+            <a:pPr algn="ctr"/>
+            <a:r>
+              <a:rPr lang="pt-BR" dirty="0" smtClean="0"/>
+              <a:t>Totem de autoatendimento</a:t>
+            </a:r>
+            <a:endParaRPr lang="pt-BR" dirty="0"/>
+          </a:p>
+        </p:txBody>
+      </p:sp>
+      <p:sp>
+        <p:nvSpPr>
+          <p:cNvPr id="46" name="CaixaDeTexto 45"/>
+          <p:cNvSpPr txBox="1"/>
+          <p:nvPr/>
+        </p:nvSpPr>
+        <p:spPr>
+          <a:xfrm>
+            <a:off x="5265956" y="3800564"/>
+            <a:ext cx="1996637" cy="646331"/>
+          </a:xfrm>
+          <a:prstGeom prst="rect">
+            <a:avLst/>
+          </a:prstGeom>
+          <a:noFill/>
+        </p:spPr>
+        <p:txBody>
+          <a:bodyPr wrap="square" rtlCol="0">
+            <a:spAutoFit/>
+          </a:bodyPr>
+          <a:lstStyle/>
+          <a:p>
+            <a:pPr algn="ctr"/>
+            <a:r>
+              <a:rPr lang="pt-BR" dirty="0" smtClean="0"/>
+              <a:t>Relatório de dados da Máquina</a:t>
+            </a:r>
+            <a:endParaRPr lang="pt-BR" dirty="0"/>
+          </a:p>
+        </p:txBody>
+      </p:sp>
+      <p:sp>
+        <p:nvSpPr>
+          <p:cNvPr id="47" name="CaixaDeTexto 46"/>
+          <p:cNvSpPr txBox="1"/>
+          <p:nvPr/>
+        </p:nvSpPr>
+        <p:spPr>
+          <a:xfrm>
+            <a:off x="7723987" y="3844328"/>
+            <a:ext cx="1996637" cy="646331"/>
+          </a:xfrm>
+          <a:prstGeom prst="rect">
+            <a:avLst/>
+          </a:prstGeom>
+          <a:noFill/>
+        </p:spPr>
+        <p:txBody>
+          <a:bodyPr wrap="square" rtlCol="0">
+            <a:spAutoFit/>
+          </a:bodyPr>
+          <a:lstStyle/>
+          <a:p>
+            <a:pPr algn="ctr"/>
+            <a:r>
+              <a:rPr lang="pt-BR" dirty="0" smtClean="0"/>
+              <a:t>Tela com os dados coletados</a:t>
+            </a:r>
+            <a:endParaRPr lang="pt-BR" dirty="0"/>
+          </a:p>
+        </p:txBody>
+      </p:sp>
+      <p:sp>
+        <p:nvSpPr>
+          <p:cNvPr id="48" name="CaixaDeTexto 47"/>
+          <p:cNvSpPr txBox="1"/>
+          <p:nvPr/>
+        </p:nvSpPr>
+        <p:spPr>
+          <a:xfrm>
+            <a:off x="10074570" y="4683181"/>
+            <a:ext cx="1996637" cy="1477328"/>
+          </a:xfrm>
+          <a:prstGeom prst="rect">
+            <a:avLst/>
+          </a:prstGeom>
+          <a:noFill/>
+        </p:spPr>
+        <p:txBody>
+          <a:bodyPr wrap="square" rtlCol="0">
+            <a:spAutoFit/>
+          </a:bodyPr>
+          <a:lstStyle/>
+          <a:p>
+            <a:pPr algn="ctr"/>
+            <a:r>
+              <a:rPr lang="pt-BR" dirty="0" smtClean="0"/>
+              <a:t>Funcionalidades</a:t>
+            </a:r>
+          </a:p>
+          <a:p>
+            <a:pPr algn="ctr"/>
+            <a:endParaRPr lang="pt-BR" dirty="0" smtClean="0"/>
+          </a:p>
+          <a:p>
+            <a:pPr algn="ctr"/>
+            <a:r>
+              <a:rPr lang="pt-BR" dirty="0" smtClean="0"/>
+              <a:t>Notificação</a:t>
+            </a:r>
+          </a:p>
+          <a:p>
+            <a:pPr algn="ctr"/>
+            <a:r>
+              <a:rPr lang="pt-BR" dirty="0" smtClean="0"/>
+              <a:t>Reinicialização</a:t>
+            </a:r>
+          </a:p>
+          <a:p>
+            <a:pPr algn="ctr"/>
+            <a:r>
+              <a:rPr lang="pt-BR" dirty="0" smtClean="0"/>
+              <a:t>Limpeza de Cache</a:t>
+            </a:r>
+            <a:endParaRPr lang="pt-BR" dirty="0"/>
+          </a:p>
+        </p:txBody>
+      </p:sp>
+    </p:spTree>
+    <p:extLst>
+      <p:ext uri="{BB962C8B-B14F-4D97-AF65-F5344CB8AC3E}">
+        <p14:creationId xmlns:p14="http://schemas.microsoft.com/office/powerpoint/2010/main" val="1984712920"/>
       </p:ext>
     </p:extLst>
   </p:cSld>

</xml_diff>